<commit_message>
More additions on simulation side. It is now easier to collect data for different control methods and compare their results with each other.
</commit_message>
<xml_diff>
--- a/Simulation/MPC/Sunumlar/MPC_sunum_week44.pptx
+++ b/Simulation/MPC/Sunumlar/MPC_sunum_week44.pptx
@@ -270,7 +270,7 @@
           <a:p>
             <a:fld id="{F142C53B-C2C1-44E3-AC12-604A7FE2CADF}" type="datetimeFigureOut">
               <a:rPr lang="tr-TR" smtClean="0"/>
-              <a:t>1.11.2020</a:t>
+              <a:t>2.11.2020</a:t>
             </a:fld>
             <a:endParaRPr lang="tr-TR"/>
           </a:p>
@@ -468,7 +468,7 @@
           <a:p>
             <a:fld id="{F142C53B-C2C1-44E3-AC12-604A7FE2CADF}" type="datetimeFigureOut">
               <a:rPr lang="tr-TR" smtClean="0"/>
-              <a:t>1.11.2020</a:t>
+              <a:t>2.11.2020</a:t>
             </a:fld>
             <a:endParaRPr lang="tr-TR"/>
           </a:p>
@@ -676,7 +676,7 @@
           <a:p>
             <a:fld id="{F142C53B-C2C1-44E3-AC12-604A7FE2CADF}" type="datetimeFigureOut">
               <a:rPr lang="tr-TR" smtClean="0"/>
-              <a:t>1.11.2020</a:t>
+              <a:t>2.11.2020</a:t>
             </a:fld>
             <a:endParaRPr lang="tr-TR"/>
           </a:p>
@@ -874,7 +874,7 @@
           <a:p>
             <a:fld id="{F142C53B-C2C1-44E3-AC12-604A7FE2CADF}" type="datetimeFigureOut">
               <a:rPr lang="tr-TR" smtClean="0"/>
-              <a:t>1.11.2020</a:t>
+              <a:t>2.11.2020</a:t>
             </a:fld>
             <a:endParaRPr lang="tr-TR"/>
           </a:p>
@@ -1149,7 +1149,7 @@
           <a:p>
             <a:fld id="{F142C53B-C2C1-44E3-AC12-604A7FE2CADF}" type="datetimeFigureOut">
               <a:rPr lang="tr-TR" smtClean="0"/>
-              <a:t>1.11.2020</a:t>
+              <a:t>2.11.2020</a:t>
             </a:fld>
             <a:endParaRPr lang="tr-TR"/>
           </a:p>
@@ -1414,7 +1414,7 @@
           <a:p>
             <a:fld id="{F142C53B-C2C1-44E3-AC12-604A7FE2CADF}" type="datetimeFigureOut">
               <a:rPr lang="tr-TR" smtClean="0"/>
-              <a:t>1.11.2020</a:t>
+              <a:t>2.11.2020</a:t>
             </a:fld>
             <a:endParaRPr lang="tr-TR"/>
           </a:p>
@@ -1826,7 +1826,7 @@
           <a:p>
             <a:fld id="{F142C53B-C2C1-44E3-AC12-604A7FE2CADF}" type="datetimeFigureOut">
               <a:rPr lang="tr-TR" smtClean="0"/>
-              <a:t>1.11.2020</a:t>
+              <a:t>2.11.2020</a:t>
             </a:fld>
             <a:endParaRPr lang="tr-TR"/>
           </a:p>
@@ -1967,7 +1967,7 @@
           <a:p>
             <a:fld id="{F142C53B-C2C1-44E3-AC12-604A7FE2CADF}" type="datetimeFigureOut">
               <a:rPr lang="tr-TR" smtClean="0"/>
-              <a:t>1.11.2020</a:t>
+              <a:t>2.11.2020</a:t>
             </a:fld>
             <a:endParaRPr lang="tr-TR"/>
           </a:p>
@@ -2080,7 +2080,7 @@
           <a:p>
             <a:fld id="{F142C53B-C2C1-44E3-AC12-604A7FE2CADF}" type="datetimeFigureOut">
               <a:rPr lang="tr-TR" smtClean="0"/>
-              <a:t>1.11.2020</a:t>
+              <a:t>2.11.2020</a:t>
             </a:fld>
             <a:endParaRPr lang="tr-TR"/>
           </a:p>
@@ -2391,7 +2391,7 @@
           <a:p>
             <a:fld id="{F142C53B-C2C1-44E3-AC12-604A7FE2CADF}" type="datetimeFigureOut">
               <a:rPr lang="tr-TR" smtClean="0"/>
-              <a:t>1.11.2020</a:t>
+              <a:t>2.11.2020</a:t>
             </a:fld>
             <a:endParaRPr lang="tr-TR"/>
           </a:p>
@@ -2679,7 +2679,7 @@
           <a:p>
             <a:fld id="{F142C53B-C2C1-44E3-AC12-604A7FE2CADF}" type="datetimeFigureOut">
               <a:rPr lang="tr-TR" smtClean="0"/>
-              <a:t>1.11.2020</a:t>
+              <a:t>2.11.2020</a:t>
             </a:fld>
             <a:endParaRPr lang="tr-TR"/>
           </a:p>
@@ -2920,7 +2920,7 @@
           <a:p>
             <a:fld id="{F142C53B-C2C1-44E3-AC12-604A7FE2CADF}" type="datetimeFigureOut">
               <a:rPr lang="tr-TR" smtClean="0"/>
-              <a:t>1.11.2020</a:t>
+              <a:t>2.11.2020</a:t>
             </a:fld>
             <a:endParaRPr lang="tr-TR"/>
           </a:p>
@@ -3549,7 +3549,7 @@
             <p:ph idx="1"/>
             <p:extLst>
               <p:ext uri="{D42A27DB-BD31-4B8C-83A1-F6EECF244321}">
-                <p14:modId xmlns:p14="http://schemas.microsoft.com/office/powerpoint/2010/main" val="3145742646"/>
+                <p14:modId xmlns:p14="http://schemas.microsoft.com/office/powerpoint/2010/main" val="4194630279"/>
               </p:ext>
             </p:extLst>
           </p:nvPr>
@@ -3970,7 +3970,7 @@
                     <a:p>
                       <a:pPr algn="ctr" rtl="0" fontAlgn="b"/>
                       <a:r>
-                        <a:rPr lang="tr-TR">
+                        <a:rPr lang="tr-TR" dirty="0">
                           <a:effectLst/>
                         </a:rPr>
                         <a:t>76</a:t>
@@ -4219,7 +4219,7 @@
                     <a:p>
                       <a:pPr algn="ctr" rtl="0" fontAlgn="b"/>
                       <a:r>
-                        <a:rPr lang="tr-TR">
+                        <a:rPr lang="tr-TR" dirty="0">
                           <a:effectLst/>
                         </a:rPr>
                         <a:t>3,04</a:t>
@@ -4272,7 +4272,7 @@
                     <a:p>
                       <a:pPr algn="ctr" rtl="0" fontAlgn="b"/>
                       <a:r>
-                        <a:rPr lang="tr-TR">
+                        <a:rPr lang="tr-TR" dirty="0">
                           <a:effectLst/>
                         </a:rPr>
                         <a:t>3,5</a:t>
@@ -4337,9 +4337,12 @@
                         </a:rPr>
                         <a:t>Power</a:t>
                       </a:r>
-                      <a:endParaRPr lang="tr-TR" dirty="0">
-                        <a:effectLst/>
-                      </a:endParaRPr>
+                      <a:r>
+                        <a:rPr lang="tr-TR" dirty="0">
+                          <a:effectLst/>
+                        </a:rPr>
+                        <a:t> (W)</a:t>
+                      </a:r>
                     </a:p>
                   </a:txBody>
                   <a:tcPr marL="28575" marR="28575" marT="19050" marB="19050" anchor="b">
@@ -4557,7 +4560,7 @@
                         <a:rPr lang="tr-TR" dirty="0">
                           <a:effectLst/>
                         </a:rPr>
-                        <a:t> </a:t>
+                        <a:t> (%) </a:t>
                       </a:r>
                     </a:p>
                   </a:txBody>

</xml_diff>